<commit_message>
PPT updated with reference and conclusion
</commit_message>
<xml_diff>
--- a/Documents/Leaf.pptx
+++ b/Documents/Leaf.pptx
@@ -18,8 +18,8 @@
     <p:sldId id="266" r:id="rId12"/>
     <p:sldId id="267" r:id="rId13"/>
     <p:sldId id="268" r:id="rId14"/>
-    <p:sldId id="270" r:id="rId15"/>
-    <p:sldId id="269" r:id="rId16"/>
+    <p:sldId id="269" r:id="rId15"/>
+    <p:sldId id="270" r:id="rId16"/>
   </p:sldIdLst>
   <p:sldSz cx="12192000" cy="6858000"/>
   <p:notesSz cx="6858000" cy="9144000"/>
@@ -273,7 +273,7 @@
           <a:p>
             <a:fld id="{AD112B6E-7EC9-4ADB-956C-2E07C83B1B14}" type="datetimeFigureOut">
               <a:rPr lang="en-US" smtClean="0"/>
-              <a:t>20-Mar-24</a:t>
+              <a:t>21-Mar-24</a:t>
             </a:fld>
             <a:endParaRPr lang="en-US"/>
           </a:p>
@@ -471,7 +471,7 @@
           <a:p>
             <a:fld id="{AD112B6E-7EC9-4ADB-956C-2E07C83B1B14}" type="datetimeFigureOut">
               <a:rPr lang="en-US" smtClean="0"/>
-              <a:t>20-Mar-24</a:t>
+              <a:t>21-Mar-24</a:t>
             </a:fld>
             <a:endParaRPr lang="en-US"/>
           </a:p>
@@ -679,7 +679,7 @@
           <a:p>
             <a:fld id="{AD112B6E-7EC9-4ADB-956C-2E07C83B1B14}" type="datetimeFigureOut">
               <a:rPr lang="en-US" smtClean="0"/>
-              <a:t>20-Mar-24</a:t>
+              <a:t>21-Mar-24</a:t>
             </a:fld>
             <a:endParaRPr lang="en-US"/>
           </a:p>
@@ -877,7 +877,7 @@
           <a:p>
             <a:fld id="{AD112B6E-7EC9-4ADB-956C-2E07C83B1B14}" type="datetimeFigureOut">
               <a:rPr lang="en-US" smtClean="0"/>
-              <a:t>20-Mar-24</a:t>
+              <a:t>21-Mar-24</a:t>
             </a:fld>
             <a:endParaRPr lang="en-US"/>
           </a:p>
@@ -1152,7 +1152,7 @@
           <a:p>
             <a:fld id="{AD112B6E-7EC9-4ADB-956C-2E07C83B1B14}" type="datetimeFigureOut">
               <a:rPr lang="en-US" smtClean="0"/>
-              <a:t>20-Mar-24</a:t>
+              <a:t>21-Mar-24</a:t>
             </a:fld>
             <a:endParaRPr lang="en-US"/>
           </a:p>
@@ -1417,7 +1417,7 @@
           <a:p>
             <a:fld id="{AD112B6E-7EC9-4ADB-956C-2E07C83B1B14}" type="datetimeFigureOut">
               <a:rPr lang="en-US" smtClean="0"/>
-              <a:t>20-Mar-24</a:t>
+              <a:t>21-Mar-24</a:t>
             </a:fld>
             <a:endParaRPr lang="en-US"/>
           </a:p>
@@ -1829,7 +1829,7 @@
           <a:p>
             <a:fld id="{AD112B6E-7EC9-4ADB-956C-2E07C83B1B14}" type="datetimeFigureOut">
               <a:rPr lang="en-US" smtClean="0"/>
-              <a:t>20-Mar-24</a:t>
+              <a:t>21-Mar-24</a:t>
             </a:fld>
             <a:endParaRPr lang="en-US"/>
           </a:p>
@@ -1970,7 +1970,7 @@
           <a:p>
             <a:fld id="{AD112B6E-7EC9-4ADB-956C-2E07C83B1B14}" type="datetimeFigureOut">
               <a:rPr lang="en-US" smtClean="0"/>
-              <a:t>20-Mar-24</a:t>
+              <a:t>21-Mar-24</a:t>
             </a:fld>
             <a:endParaRPr lang="en-US"/>
           </a:p>
@@ -2083,7 +2083,7 @@
           <a:p>
             <a:fld id="{AD112B6E-7EC9-4ADB-956C-2E07C83B1B14}" type="datetimeFigureOut">
               <a:rPr lang="en-US" smtClean="0"/>
-              <a:t>20-Mar-24</a:t>
+              <a:t>21-Mar-24</a:t>
             </a:fld>
             <a:endParaRPr lang="en-US"/>
           </a:p>
@@ -2394,7 +2394,7 @@
           <a:p>
             <a:fld id="{AD112B6E-7EC9-4ADB-956C-2E07C83B1B14}" type="datetimeFigureOut">
               <a:rPr lang="en-US" smtClean="0"/>
-              <a:t>20-Mar-24</a:t>
+              <a:t>21-Mar-24</a:t>
             </a:fld>
             <a:endParaRPr lang="en-US"/>
           </a:p>
@@ -2682,7 +2682,7 @@
           <a:p>
             <a:fld id="{AD112B6E-7EC9-4ADB-956C-2E07C83B1B14}" type="datetimeFigureOut">
               <a:rPr lang="en-US" smtClean="0"/>
-              <a:t>20-Mar-24</a:t>
+              <a:t>21-Mar-24</a:t>
             </a:fld>
             <a:endParaRPr lang="en-US"/>
           </a:p>
@@ -2923,7 +2923,7 @@
           <a:p>
             <a:fld id="{AD112B6E-7EC9-4ADB-956C-2E07C83B1B14}" type="datetimeFigureOut">
               <a:rPr lang="en-US" smtClean="0"/>
-              <a:t>20-Mar-24</a:t>
+              <a:t>21-Mar-24</a:t>
             </a:fld>
             <a:endParaRPr lang="en-US"/>
           </a:p>
@@ -3869,8 +3869,8 @@
         </p:nvSpPr>
         <p:spPr>
           <a:xfrm>
-            <a:off x="3736257" y="958646"/>
-            <a:ext cx="4719485" cy="769441"/>
+            <a:off x="3187411" y="1064595"/>
+            <a:ext cx="5817176" cy="954107"/>
           </a:xfrm>
           <a:prstGeom prst="rect">
             <a:avLst/>
@@ -3883,8 +3883,9 @@
           </a:bodyPr>
           <a:lstStyle/>
           <a:p>
-            <a:r>
-              <a:rPr lang="en-US" sz="2200" b="1" dirty="0">
+            <a:pPr algn="ctr"/>
+            <a:r>
+              <a:rPr lang="en-US" sz="2800" b="1" dirty="0">
                 <a:solidFill>
                   <a:srgbClr val="000000"/>
                 </a:solidFill>
@@ -3895,7 +3896,7 @@
               </a:rPr>
               <a:t>Block-3 AI with Embedded System</a:t>
             </a:r>
-            <a:endParaRPr lang="en-US" sz="2200" dirty="0">
+            <a:endParaRPr lang="en-US" sz="2800" dirty="0">
               <a:effectLst/>
               <a:latin typeface="Times New Roman" panose="02020603050405020304" pitchFamily="18" charset="0"/>
               <a:ea typeface="Calibri" panose="020F0502020204030204" pitchFamily="34" charset="0"/>
@@ -3903,7 +3904,8 @@
             </a:endParaRPr>
           </a:p>
           <a:p>
-            <a:endParaRPr lang="en-US" sz="2200" dirty="0">
+            <a:pPr algn="ctr"/>
+            <a:endParaRPr lang="en-US" sz="2800" dirty="0">
               <a:latin typeface="Times New Roman" panose="02020603050405020304" pitchFamily="18" charset="0"/>
               <a:cs typeface="Times New Roman" panose="02020603050405020304" pitchFamily="18" charset="0"/>
             </a:endParaRPr>
@@ -3978,10 +3980,571 @@
           <a:chExt cx="0" cy="0"/>
         </a:xfrm>
       </p:grpSpPr>
+      <p:sp>
+        <p:nvSpPr>
+          <p:cNvPr id="2" name="TextBox 1">
+            <a:extLst>
+              <a:ext uri="{FF2B5EF4-FFF2-40B4-BE49-F238E27FC236}">
+                <a16:creationId xmlns:a16="http://schemas.microsoft.com/office/drawing/2014/main" id="{D280DE6B-EEDA-7E1D-215D-B2F784A1054D}"/>
+              </a:ext>
+            </a:extLst>
+          </p:cNvPr>
+          <p:cNvSpPr txBox="1"/>
+          <p:nvPr/>
+        </p:nvSpPr>
+        <p:spPr>
+          <a:xfrm>
+            <a:off x="3646538" y="606325"/>
+            <a:ext cx="4898923" cy="707886"/>
+          </a:xfrm>
+          <a:prstGeom prst="rect">
+            <a:avLst/>
+          </a:prstGeom>
+          <a:noFill/>
+        </p:spPr>
+        <p:txBody>
+          <a:bodyPr wrap="square" rtlCol="0">
+            <a:spAutoFit/>
+          </a:bodyPr>
+          <a:lstStyle/>
+          <a:p>
+            <a:pPr algn="ctr"/>
+            <a:r>
+              <a:rPr lang="en-US" sz="4000" b="1" dirty="0">
+                <a:latin typeface="Times New Roman" panose="02020603050405020304" pitchFamily="18" charset="0"/>
+                <a:cs typeface="Times New Roman" panose="02020603050405020304" pitchFamily="18" charset="0"/>
+              </a:rPr>
+              <a:t>REFERENCE</a:t>
+            </a:r>
+          </a:p>
+        </p:txBody>
+      </p:sp>
+      <p:sp>
+        <p:nvSpPr>
+          <p:cNvPr id="3" name="TextBox 2">
+            <a:extLst>
+              <a:ext uri="{FF2B5EF4-FFF2-40B4-BE49-F238E27FC236}">
+                <a16:creationId xmlns:a16="http://schemas.microsoft.com/office/drawing/2014/main" id="{D411E838-0510-AD47-90B9-A95AC581EF3B}"/>
+              </a:ext>
+            </a:extLst>
+          </p:cNvPr>
+          <p:cNvSpPr txBox="1"/>
+          <p:nvPr/>
+        </p:nvSpPr>
+        <p:spPr>
+          <a:xfrm>
+            <a:off x="1448936" y="1569493"/>
+            <a:ext cx="9294126" cy="5016758"/>
+          </a:xfrm>
+          <a:prstGeom prst="rect">
+            <a:avLst/>
+          </a:prstGeom>
+          <a:noFill/>
+        </p:spPr>
+        <p:txBody>
+          <a:bodyPr wrap="square" rtlCol="0">
+            <a:spAutoFit/>
+          </a:bodyPr>
+          <a:lstStyle/>
+          <a:p>
+            <a:pPr marL="285750" indent="-285750" algn="just">
+              <a:buFont typeface="Arial" panose="020B0604020202020204" pitchFamily="34" charset="0"/>
+              <a:buChar char="•"/>
+            </a:pPr>
+            <a:r>
+              <a:rPr lang="en-US" sz="2000" dirty="0" err="1">
+                <a:solidFill>
+                  <a:srgbClr val="000000"/>
+                </a:solidFill>
+                <a:effectLst/>
+                <a:latin typeface="Times New Roman" panose="02020603050405020304" pitchFamily="18" charset="0"/>
+                <a:ea typeface="Calibri" panose="020F0502020204030204" pitchFamily="34" charset="0"/>
+              </a:rPr>
+              <a:t>Umit</a:t>
+            </a:r>
+            <a:r>
+              <a:rPr lang="en-US" sz="2000" dirty="0">
+                <a:solidFill>
+                  <a:srgbClr val="000000"/>
+                </a:solidFill>
+                <a:effectLst/>
+                <a:latin typeface="Times New Roman" panose="02020603050405020304" pitchFamily="18" charset="0"/>
+                <a:ea typeface="Calibri" panose="020F0502020204030204" pitchFamily="34" charset="0"/>
+              </a:rPr>
+              <a:t> </a:t>
+            </a:r>
+            <a:r>
+              <a:rPr lang="en-US" sz="2000" dirty="0" err="1">
+                <a:solidFill>
+                  <a:srgbClr val="000000"/>
+                </a:solidFill>
+                <a:effectLst/>
+                <a:latin typeface="Times New Roman" panose="02020603050405020304" pitchFamily="18" charset="0"/>
+                <a:ea typeface="Calibri" panose="020F0502020204030204" pitchFamily="34" charset="0"/>
+              </a:rPr>
+              <a:t>Atilaa</a:t>
+            </a:r>
+            <a:r>
+              <a:rPr lang="en-US" sz="2000" dirty="0">
+                <a:solidFill>
+                  <a:srgbClr val="000000"/>
+                </a:solidFill>
+                <a:effectLst/>
+                <a:latin typeface="Times New Roman" panose="02020603050405020304" pitchFamily="18" charset="0"/>
+                <a:ea typeface="Calibri" panose="020F0502020204030204" pitchFamily="34" charset="0"/>
+              </a:rPr>
+              <a:t>, Murat </a:t>
+            </a:r>
+            <a:r>
+              <a:rPr lang="en-US" sz="2000" dirty="0" err="1">
+                <a:solidFill>
+                  <a:srgbClr val="000000"/>
+                </a:solidFill>
+                <a:effectLst/>
+                <a:latin typeface="Times New Roman" panose="02020603050405020304" pitchFamily="18" charset="0"/>
+                <a:ea typeface="Calibri" panose="020F0502020204030204" pitchFamily="34" charset="0"/>
+              </a:rPr>
+              <a:t>Uçarb</a:t>
+            </a:r>
+            <a:r>
+              <a:rPr lang="en-US" sz="2000" dirty="0">
+                <a:solidFill>
+                  <a:srgbClr val="000000"/>
+                </a:solidFill>
+                <a:effectLst/>
+                <a:latin typeface="Times New Roman" panose="02020603050405020304" pitchFamily="18" charset="0"/>
+                <a:ea typeface="Calibri" panose="020F0502020204030204" pitchFamily="34" charset="0"/>
+              </a:rPr>
+              <a:t>, Kemal </a:t>
+            </a:r>
+            <a:r>
+              <a:rPr lang="en-US" sz="2000" dirty="0" err="1">
+                <a:solidFill>
+                  <a:srgbClr val="000000"/>
+                </a:solidFill>
+                <a:effectLst/>
+                <a:latin typeface="Times New Roman" panose="02020603050405020304" pitchFamily="18" charset="0"/>
+                <a:ea typeface="Calibri" panose="020F0502020204030204" pitchFamily="34" charset="0"/>
+              </a:rPr>
+              <a:t>Akyolc</a:t>
+            </a:r>
+            <a:r>
+              <a:rPr lang="en-US" sz="2000" dirty="0">
+                <a:solidFill>
+                  <a:srgbClr val="000000"/>
+                </a:solidFill>
+                <a:effectLst/>
+                <a:latin typeface="Times New Roman" panose="02020603050405020304" pitchFamily="18" charset="0"/>
+                <a:ea typeface="Calibri" panose="020F0502020204030204" pitchFamily="34" charset="0"/>
+              </a:rPr>
+              <a:t>, and </a:t>
+            </a:r>
+            <a:r>
+              <a:rPr lang="en-US" sz="2000" dirty="0" err="1">
+                <a:solidFill>
+                  <a:srgbClr val="000000"/>
+                </a:solidFill>
+                <a:effectLst/>
+                <a:latin typeface="Times New Roman" panose="02020603050405020304" pitchFamily="18" charset="0"/>
+                <a:ea typeface="Calibri" panose="020F0502020204030204" pitchFamily="34" charset="0"/>
+              </a:rPr>
+              <a:t>Emine</a:t>
+            </a:r>
+            <a:r>
+              <a:rPr lang="en-US" sz="2000" dirty="0">
+                <a:solidFill>
+                  <a:srgbClr val="000000"/>
+                </a:solidFill>
+                <a:effectLst/>
+                <a:latin typeface="Times New Roman" panose="02020603050405020304" pitchFamily="18" charset="0"/>
+                <a:ea typeface="Calibri" panose="020F0502020204030204" pitchFamily="34" charset="0"/>
+              </a:rPr>
+              <a:t> </a:t>
+            </a:r>
+            <a:r>
+              <a:rPr lang="en-US" sz="2000" dirty="0" err="1">
+                <a:solidFill>
+                  <a:srgbClr val="000000"/>
+                </a:solidFill>
+                <a:effectLst/>
+                <a:latin typeface="Times New Roman" panose="02020603050405020304" pitchFamily="18" charset="0"/>
+                <a:ea typeface="Calibri" panose="020F0502020204030204" pitchFamily="34" charset="0"/>
+              </a:rPr>
+              <a:t>Uçar</a:t>
+            </a:r>
+            <a:r>
+              <a:rPr lang="en-US" sz="2000" dirty="0">
+                <a:solidFill>
+                  <a:srgbClr val="000000"/>
+                </a:solidFill>
+                <a:effectLst/>
+                <a:latin typeface="Times New Roman" panose="02020603050405020304" pitchFamily="18" charset="0"/>
+                <a:ea typeface="Calibri" panose="020F0502020204030204" pitchFamily="34" charset="0"/>
+              </a:rPr>
+              <a:t>, "Plant leaf disease classification using </a:t>
+            </a:r>
+            <a:r>
+              <a:rPr lang="en-US" sz="2000" dirty="0" err="1">
+                <a:solidFill>
+                  <a:srgbClr val="000000"/>
+                </a:solidFill>
+                <a:effectLst/>
+                <a:latin typeface="Times New Roman" panose="02020603050405020304" pitchFamily="18" charset="0"/>
+                <a:ea typeface="Calibri" panose="020F0502020204030204" pitchFamily="34" charset="0"/>
+              </a:rPr>
+              <a:t>EfficientNet</a:t>
+            </a:r>
+            <a:r>
+              <a:rPr lang="en-US" sz="2000" dirty="0">
+                <a:solidFill>
+                  <a:srgbClr val="000000"/>
+                </a:solidFill>
+                <a:effectLst/>
+                <a:latin typeface="Times New Roman" panose="02020603050405020304" pitchFamily="18" charset="0"/>
+                <a:ea typeface="Calibri" panose="020F0502020204030204" pitchFamily="34" charset="0"/>
+              </a:rPr>
+              <a:t> deep learning model," Ecological Informatics, vol.61, Article 101182, March 2021</a:t>
+            </a:r>
+          </a:p>
+          <a:p>
+            <a:pPr marL="285750" indent="-285750" algn="just">
+              <a:buFont typeface="Arial" panose="020B0604020202020204" pitchFamily="34" charset="0"/>
+              <a:buChar char="•"/>
+            </a:pPr>
+            <a:r>
+              <a:rPr lang="en-US" sz="2000" dirty="0" err="1">
+                <a:solidFill>
+                  <a:srgbClr val="000000"/>
+                </a:solidFill>
+                <a:effectLst/>
+                <a:latin typeface="Times New Roman" panose="02020603050405020304" pitchFamily="18" charset="0"/>
+                <a:ea typeface="Calibri" panose="020F0502020204030204" pitchFamily="34" charset="0"/>
+              </a:rPr>
+              <a:t>M.Akila</a:t>
+            </a:r>
+            <a:r>
+              <a:rPr lang="en-US" sz="2000" dirty="0">
+                <a:solidFill>
+                  <a:srgbClr val="000000"/>
+                </a:solidFill>
+                <a:effectLst/>
+                <a:latin typeface="Times New Roman" panose="02020603050405020304" pitchFamily="18" charset="0"/>
+                <a:ea typeface="Calibri" panose="020F0502020204030204" pitchFamily="34" charset="0"/>
+              </a:rPr>
+              <a:t> and </a:t>
+            </a:r>
+            <a:r>
+              <a:rPr lang="en-US" sz="2000" dirty="0" err="1">
+                <a:solidFill>
+                  <a:srgbClr val="000000"/>
+                </a:solidFill>
+                <a:effectLst/>
+                <a:latin typeface="Times New Roman" panose="02020603050405020304" pitchFamily="18" charset="0"/>
+                <a:ea typeface="Calibri" panose="020F0502020204030204" pitchFamily="34" charset="0"/>
+              </a:rPr>
+              <a:t>P.Deepan</a:t>
+            </a:r>
+            <a:r>
+              <a:rPr lang="en-US" sz="2000" dirty="0">
+                <a:solidFill>
+                  <a:srgbClr val="000000"/>
+                </a:solidFill>
+                <a:effectLst/>
+                <a:latin typeface="Times New Roman" panose="02020603050405020304" pitchFamily="18" charset="0"/>
+                <a:ea typeface="Calibri" panose="020F0502020204030204" pitchFamily="34" charset="0"/>
+              </a:rPr>
+              <a:t>, "Detection and Classification of Plant Leaf Diseases by using Deep Learning Algorithm," International Journal of Engineering Research &amp; Technology (IJERT), SSN: 2278-0181, 2018 </a:t>
+            </a:r>
+            <a:endParaRPr lang="en-US" sz="2000" dirty="0">
+              <a:solidFill>
+                <a:srgbClr val="000000"/>
+              </a:solidFill>
+              <a:latin typeface="Times New Roman" panose="02020603050405020304" pitchFamily="18" charset="0"/>
+              <a:ea typeface="Calibri" panose="020F0502020204030204" pitchFamily="34" charset="0"/>
+            </a:endParaRPr>
+          </a:p>
+          <a:p>
+            <a:pPr marL="285750" indent="-285750" algn="just">
+              <a:buFont typeface="Arial" panose="020B0604020202020204" pitchFamily="34" charset="0"/>
+              <a:buChar char="•"/>
+            </a:pPr>
+            <a:r>
+              <a:rPr lang="en-US" sz="2000" dirty="0" err="1">
+                <a:solidFill>
+                  <a:srgbClr val="000000"/>
+                </a:solidFill>
+                <a:effectLst/>
+                <a:latin typeface="Times New Roman" panose="02020603050405020304" pitchFamily="18" charset="0"/>
+                <a:ea typeface="Calibri" panose="020F0502020204030204" pitchFamily="34" charset="0"/>
+                <a:cs typeface="Latha" panose="020B0604020202020204" pitchFamily="34" charset="0"/>
+              </a:rPr>
+              <a:t>Srdjan</a:t>
+            </a:r>
+            <a:r>
+              <a:rPr lang="en-US" sz="2000" dirty="0">
+                <a:solidFill>
+                  <a:srgbClr val="000000"/>
+                </a:solidFill>
+                <a:effectLst/>
+                <a:latin typeface="Times New Roman" panose="02020603050405020304" pitchFamily="18" charset="0"/>
+                <a:ea typeface="Calibri" panose="020F0502020204030204" pitchFamily="34" charset="0"/>
+                <a:cs typeface="Latha" panose="020B0604020202020204" pitchFamily="34" charset="0"/>
+              </a:rPr>
+              <a:t> </a:t>
+            </a:r>
+            <a:r>
+              <a:rPr lang="en-US" sz="2000" dirty="0" err="1">
+                <a:solidFill>
+                  <a:srgbClr val="000000"/>
+                </a:solidFill>
+                <a:effectLst/>
+                <a:latin typeface="Times New Roman" panose="02020603050405020304" pitchFamily="18" charset="0"/>
+                <a:ea typeface="Calibri" panose="020F0502020204030204" pitchFamily="34" charset="0"/>
+                <a:cs typeface="Latha" panose="020B0604020202020204" pitchFamily="34" charset="0"/>
+              </a:rPr>
+              <a:t>Sladojevic</a:t>
+            </a:r>
+            <a:r>
+              <a:rPr lang="en-US" sz="2000" dirty="0">
+                <a:solidFill>
+                  <a:srgbClr val="000000"/>
+                </a:solidFill>
+                <a:effectLst/>
+                <a:latin typeface="Times New Roman" panose="02020603050405020304" pitchFamily="18" charset="0"/>
+                <a:ea typeface="Calibri" panose="020F0502020204030204" pitchFamily="34" charset="0"/>
+                <a:cs typeface="Latha" panose="020B0604020202020204" pitchFamily="34" charset="0"/>
+              </a:rPr>
+              <a:t>, Marko </a:t>
+            </a:r>
+            <a:r>
+              <a:rPr lang="en-US" sz="2000" dirty="0" err="1">
+                <a:solidFill>
+                  <a:srgbClr val="000000"/>
+                </a:solidFill>
+                <a:effectLst/>
+                <a:latin typeface="Times New Roman" panose="02020603050405020304" pitchFamily="18" charset="0"/>
+                <a:ea typeface="Calibri" panose="020F0502020204030204" pitchFamily="34" charset="0"/>
+                <a:cs typeface="Latha" panose="020B0604020202020204" pitchFamily="34" charset="0"/>
+              </a:rPr>
+              <a:t>Arsenovic</a:t>
+            </a:r>
+            <a:r>
+              <a:rPr lang="en-US" sz="2000" dirty="0">
+                <a:solidFill>
+                  <a:srgbClr val="000000"/>
+                </a:solidFill>
+                <a:effectLst/>
+                <a:latin typeface="Times New Roman" panose="02020603050405020304" pitchFamily="18" charset="0"/>
+                <a:ea typeface="Calibri" panose="020F0502020204030204" pitchFamily="34" charset="0"/>
+                <a:cs typeface="Latha" panose="020B0604020202020204" pitchFamily="34" charset="0"/>
+              </a:rPr>
+              <a:t>, Andras </a:t>
+            </a:r>
+            <a:r>
+              <a:rPr lang="en-US" sz="2000" dirty="0" err="1">
+                <a:solidFill>
+                  <a:srgbClr val="000000"/>
+                </a:solidFill>
+                <a:effectLst/>
+                <a:latin typeface="Times New Roman" panose="02020603050405020304" pitchFamily="18" charset="0"/>
+                <a:ea typeface="Calibri" panose="020F0502020204030204" pitchFamily="34" charset="0"/>
+                <a:cs typeface="Latha" panose="020B0604020202020204" pitchFamily="34" charset="0"/>
+              </a:rPr>
+              <a:t>Anderla</a:t>
+            </a:r>
+            <a:r>
+              <a:rPr lang="en-US" sz="2000" dirty="0">
+                <a:solidFill>
+                  <a:srgbClr val="000000"/>
+                </a:solidFill>
+                <a:effectLst/>
+                <a:latin typeface="Times New Roman" panose="02020603050405020304" pitchFamily="18" charset="0"/>
+                <a:ea typeface="Calibri" panose="020F0502020204030204" pitchFamily="34" charset="0"/>
+                <a:cs typeface="Latha" panose="020B0604020202020204" pitchFamily="34" charset="0"/>
+              </a:rPr>
+              <a:t>, </a:t>
+            </a:r>
+            <a:r>
+              <a:rPr lang="en-US" sz="2000" dirty="0" err="1">
+                <a:solidFill>
+                  <a:srgbClr val="000000"/>
+                </a:solidFill>
+                <a:effectLst/>
+                <a:latin typeface="Times New Roman" panose="02020603050405020304" pitchFamily="18" charset="0"/>
+                <a:ea typeface="Calibri" panose="020F0502020204030204" pitchFamily="34" charset="0"/>
+                <a:cs typeface="Latha" panose="020B0604020202020204" pitchFamily="34" charset="0"/>
+              </a:rPr>
+              <a:t>Dubravko</a:t>
+            </a:r>
+            <a:r>
+              <a:rPr lang="en-US" sz="2000" dirty="0">
+                <a:solidFill>
+                  <a:srgbClr val="000000"/>
+                </a:solidFill>
+                <a:effectLst/>
+                <a:latin typeface="Times New Roman" panose="02020603050405020304" pitchFamily="18" charset="0"/>
+                <a:ea typeface="Calibri" panose="020F0502020204030204" pitchFamily="34" charset="0"/>
+                <a:cs typeface="Latha" panose="020B0604020202020204" pitchFamily="34" charset="0"/>
+              </a:rPr>
+              <a:t> </a:t>
+            </a:r>
+            <a:r>
+              <a:rPr lang="en-US" sz="2000" dirty="0" err="1">
+                <a:solidFill>
+                  <a:srgbClr val="000000"/>
+                </a:solidFill>
+                <a:effectLst/>
+                <a:latin typeface="Times New Roman" panose="02020603050405020304" pitchFamily="18" charset="0"/>
+                <a:ea typeface="Calibri" panose="020F0502020204030204" pitchFamily="34" charset="0"/>
+                <a:cs typeface="Latha" panose="020B0604020202020204" pitchFamily="34" charset="0"/>
+              </a:rPr>
+              <a:t>Culibrk</a:t>
+            </a:r>
+            <a:r>
+              <a:rPr lang="en-US" sz="2000" dirty="0">
+                <a:solidFill>
+                  <a:srgbClr val="000000"/>
+                </a:solidFill>
+                <a:effectLst/>
+                <a:latin typeface="Times New Roman" panose="02020603050405020304" pitchFamily="18" charset="0"/>
+                <a:ea typeface="Calibri" panose="020F0502020204030204" pitchFamily="34" charset="0"/>
+                <a:cs typeface="Latha" panose="020B0604020202020204" pitchFamily="34" charset="0"/>
+              </a:rPr>
+              <a:t>, and Darko Stefanovic, "Deep Neural Networks Based Recognition of Plant Diseases by Leaf Image Classification," </a:t>
+            </a:r>
+            <a:r>
+              <a:rPr lang="en-US" sz="2000" dirty="0" err="1">
+                <a:solidFill>
+                  <a:srgbClr val="000000"/>
+                </a:solidFill>
+                <a:effectLst/>
+                <a:latin typeface="Times New Roman" panose="02020603050405020304" pitchFamily="18" charset="0"/>
+                <a:ea typeface="Calibri" panose="020F0502020204030204" pitchFamily="34" charset="0"/>
+                <a:cs typeface="Latha" panose="020B0604020202020204" pitchFamily="34" charset="0"/>
+              </a:rPr>
+              <a:t>Hindawi</a:t>
+            </a:r>
+            <a:r>
+              <a:rPr lang="en-US" sz="2000" dirty="0">
+                <a:solidFill>
+                  <a:srgbClr val="000000"/>
+                </a:solidFill>
+                <a:effectLst/>
+                <a:latin typeface="Times New Roman" panose="02020603050405020304" pitchFamily="18" charset="0"/>
+                <a:ea typeface="Calibri" panose="020F0502020204030204" pitchFamily="34" charset="0"/>
+                <a:cs typeface="Latha" panose="020B0604020202020204" pitchFamily="34" charset="0"/>
+              </a:rPr>
+              <a:t> Publishing Corporation Computational Intelligence and Neuroscience, vol. 2016, Article ID 3289801, 2016 </a:t>
+            </a:r>
+            <a:endParaRPr lang="en-US" sz="2000" dirty="0">
+              <a:effectLst/>
+              <a:latin typeface="Calibri" panose="020F0502020204030204" pitchFamily="34" charset="0"/>
+              <a:ea typeface="Calibri" panose="020F0502020204030204" pitchFamily="34" charset="0"/>
+              <a:cs typeface="Latha" panose="020B0604020202020204" pitchFamily="34" charset="0"/>
+            </a:endParaRPr>
+          </a:p>
+          <a:p>
+            <a:pPr marL="285750" indent="-285750" algn="just">
+              <a:buFont typeface="Arial" panose="020B0604020202020204" pitchFamily="34" charset="0"/>
+              <a:buChar char="•"/>
+            </a:pPr>
+            <a:r>
+              <a:rPr lang="en-US" sz="2000" dirty="0">
+                <a:solidFill>
+                  <a:srgbClr val="000000"/>
+                </a:solidFill>
+                <a:effectLst/>
+                <a:latin typeface="Times New Roman" panose="02020603050405020304" pitchFamily="18" charset="0"/>
+                <a:ea typeface="Calibri" panose="020F0502020204030204" pitchFamily="34" charset="0"/>
+                <a:cs typeface="Latha" panose="020B0604020202020204" pitchFamily="34" charset="0"/>
+              </a:rPr>
+              <a:t>S. B. Patil and S. K. </a:t>
+            </a:r>
+            <a:r>
+              <a:rPr lang="en-US" sz="2000" dirty="0" err="1">
+                <a:solidFill>
+                  <a:srgbClr val="000000"/>
+                </a:solidFill>
+                <a:effectLst/>
+                <a:latin typeface="Times New Roman" panose="02020603050405020304" pitchFamily="18" charset="0"/>
+                <a:ea typeface="Calibri" panose="020F0502020204030204" pitchFamily="34" charset="0"/>
+                <a:cs typeface="Latha" panose="020B0604020202020204" pitchFamily="34" charset="0"/>
+              </a:rPr>
+              <a:t>Bodhe</a:t>
+            </a:r>
+            <a:r>
+              <a:rPr lang="en-US" sz="2000" dirty="0">
+                <a:solidFill>
+                  <a:srgbClr val="000000"/>
+                </a:solidFill>
+                <a:effectLst/>
+                <a:latin typeface="Times New Roman" panose="02020603050405020304" pitchFamily="18" charset="0"/>
+                <a:ea typeface="Calibri" panose="020F0502020204030204" pitchFamily="34" charset="0"/>
+                <a:cs typeface="Latha" panose="020B0604020202020204" pitchFamily="34" charset="0"/>
+              </a:rPr>
+              <a:t>, “Leaf disease severity measurement using image processing,” International Journal of Engineering and Technology, vol.3, no.5, pp.297–301, 2011. </a:t>
+            </a:r>
+            <a:endParaRPr lang="en-US" sz="2000" dirty="0">
+              <a:effectLst/>
+              <a:latin typeface="Calibri" panose="020F0502020204030204" pitchFamily="34" charset="0"/>
+              <a:ea typeface="Calibri" panose="020F0502020204030204" pitchFamily="34" charset="0"/>
+              <a:cs typeface="Latha" panose="020B0604020202020204" pitchFamily="34" charset="0"/>
+            </a:endParaRPr>
+          </a:p>
+          <a:p>
+            <a:pPr marL="285750" indent="-285750" algn="just">
+              <a:buFont typeface="Arial" panose="020B0604020202020204" pitchFamily="34" charset="0"/>
+              <a:buChar char="•"/>
+            </a:pPr>
+            <a:r>
+              <a:rPr lang="en-US" sz="2000" dirty="0">
+                <a:solidFill>
+                  <a:srgbClr val="000000"/>
+                </a:solidFill>
+                <a:effectLst/>
+                <a:latin typeface="Times New Roman" panose="02020603050405020304" pitchFamily="18" charset="0"/>
+                <a:ea typeface="Calibri" panose="020F0502020204030204" pitchFamily="34" charset="0"/>
+                <a:cs typeface="Latha" panose="020B0604020202020204" pitchFamily="34" charset="0"/>
+              </a:rPr>
+              <a:t>P. Revathi and M. </a:t>
+            </a:r>
+            <a:r>
+              <a:rPr lang="en-US" sz="2000" dirty="0" err="1">
+                <a:solidFill>
+                  <a:srgbClr val="000000"/>
+                </a:solidFill>
+                <a:effectLst/>
+                <a:latin typeface="Times New Roman" panose="02020603050405020304" pitchFamily="18" charset="0"/>
+                <a:ea typeface="Calibri" panose="020F0502020204030204" pitchFamily="34" charset="0"/>
+                <a:cs typeface="Latha" panose="020B0604020202020204" pitchFamily="34" charset="0"/>
+              </a:rPr>
+              <a:t>Hemalatha</a:t>
+            </a:r>
+            <a:r>
+              <a:rPr lang="en-US" sz="2000" dirty="0">
+                <a:solidFill>
+                  <a:srgbClr val="000000"/>
+                </a:solidFill>
+                <a:effectLst/>
+                <a:latin typeface="Times New Roman" panose="02020603050405020304" pitchFamily="18" charset="0"/>
+                <a:ea typeface="Calibri" panose="020F0502020204030204" pitchFamily="34" charset="0"/>
+                <a:cs typeface="Latha" panose="020B0604020202020204" pitchFamily="34" charset="0"/>
+              </a:rPr>
+              <a:t>, “Identification of cotton diseases based on cross information gain deep forward neural network classifier with PSO feature selection,” International Journal of Engineering and Technology, vol.5, no.6, pp.4637–4642, 2014</a:t>
+            </a:r>
+            <a:endParaRPr lang="en-US" sz="2000" dirty="0">
+              <a:effectLst/>
+              <a:latin typeface="Calibri" panose="020F0502020204030204" pitchFamily="34" charset="0"/>
+              <a:ea typeface="Calibri" panose="020F0502020204030204" pitchFamily="34" charset="0"/>
+              <a:cs typeface="Latha" panose="020B0604020202020204" pitchFamily="34" charset="0"/>
+            </a:endParaRPr>
+          </a:p>
+        </p:txBody>
+      </p:sp>
     </p:spTree>
     <p:extLst>
       <p:ext uri="{BB962C8B-B14F-4D97-AF65-F5344CB8AC3E}">
-        <p14:creationId xmlns:p14="http://schemas.microsoft.com/office/powerpoint/2010/main" val="2903960726"/>
+        <p14:creationId xmlns:p14="http://schemas.microsoft.com/office/powerpoint/2010/main" val="2299625743"/>
       </p:ext>
     </p:extLst>
   </p:cSld>
@@ -4013,7 +4576,7 @@
           <p:cNvPr id="2" name="TextBox 1">
             <a:extLst>
               <a:ext uri="{FF2B5EF4-FFF2-40B4-BE49-F238E27FC236}">
-                <a16:creationId xmlns:a16="http://schemas.microsoft.com/office/drawing/2014/main" id="{D280DE6B-EEDA-7E1D-215D-B2F784A1054D}"/>
+                <a16:creationId xmlns:a16="http://schemas.microsoft.com/office/drawing/2014/main" id="{EB02957F-E440-7570-C325-C2F88B01EE61}"/>
               </a:ext>
             </a:extLst>
           </p:cNvPr>
@@ -4022,8 +4585,8 @@
         </p:nvSpPr>
         <p:spPr>
           <a:xfrm>
-            <a:off x="3646538" y="707925"/>
-            <a:ext cx="4898923" cy="1200329"/>
+            <a:off x="4265210" y="491319"/>
+            <a:ext cx="3661580" cy="707886"/>
           </a:xfrm>
           <a:prstGeom prst="rect">
             <a:avLst/>
@@ -4031,28 +4594,107 @@
           <a:noFill/>
         </p:spPr>
         <p:txBody>
+          <a:bodyPr wrap="none" rtlCol="0">
+            <a:spAutoFit/>
+          </a:bodyPr>
+          <a:lstStyle/>
+          <a:p>
+            <a:pPr algn="ctr"/>
+            <a:r>
+              <a:rPr lang="en-US" sz="4000" b="1" dirty="0">
+                <a:latin typeface="Times New Roman" panose="02020603050405020304" pitchFamily="18" charset="0"/>
+                <a:cs typeface="Times New Roman" panose="02020603050405020304" pitchFamily="18" charset="0"/>
+              </a:rPr>
+              <a:t>CONCLUSION</a:t>
+            </a:r>
+          </a:p>
+        </p:txBody>
+      </p:sp>
+      <p:sp>
+        <p:nvSpPr>
+          <p:cNvPr id="3" name="TextBox 2">
+            <a:extLst>
+              <a:ext uri="{FF2B5EF4-FFF2-40B4-BE49-F238E27FC236}">
+                <a16:creationId xmlns:a16="http://schemas.microsoft.com/office/drawing/2014/main" id="{B58A7C6E-3F76-3591-7D61-8B2415BCD61E}"/>
+              </a:ext>
+            </a:extLst>
+          </p:cNvPr>
+          <p:cNvSpPr txBox="1"/>
+          <p:nvPr/>
+        </p:nvSpPr>
+        <p:spPr>
+          <a:xfrm>
+            <a:off x="1715068" y="1661615"/>
+            <a:ext cx="8761863" cy="4154984"/>
+          </a:xfrm>
+          <a:prstGeom prst="rect">
+            <a:avLst/>
+          </a:prstGeom>
+          <a:noFill/>
+        </p:spPr>
+        <p:txBody>
           <a:bodyPr wrap="square" rtlCol="0">
             <a:spAutoFit/>
           </a:bodyPr>
           <a:lstStyle/>
           <a:p>
-            <a:r>
-              <a:rPr lang="en-US" sz="3600" b="1" dirty="0">
-                <a:latin typeface="Times New Roman" panose="02020603050405020304" pitchFamily="18" charset="0"/>
+            <a:pPr algn="just"/>
+            <a:r>
+              <a:rPr lang="en-US" sz="2200" dirty="0">
+                <a:solidFill>
+                  <a:srgbClr val="000000"/>
+                </a:solidFill>
+                <a:effectLst/>
+                <a:latin typeface="Times New Roman" panose="02020603050405020304" pitchFamily="18" charset="0"/>
+                <a:ea typeface="Calibri" panose="020F0502020204030204" pitchFamily="34" charset="0"/>
                 <a:cs typeface="Times New Roman" panose="02020603050405020304" pitchFamily="18" charset="0"/>
               </a:rPr>
-              <a:t>WORK DONE SO FAR</a:t>
-            </a:r>
-          </a:p>
-          <a:p>
-            <a:endParaRPr lang="en-US" sz="3600" dirty="0"/>
+              <a:t>In this project, a Hybrid Ensemble deep learning technique based architecture has been proposed for robust detection leaf disease. This architecture adopts an enhanced mixed neural network that is interconnected with series of skip pathway. The multi-stage approach overcomes the limitation of some deep convolutional networks in producing coarsely segmented outputs when processing challenging crop images. In this approach, the whole network is divided </a:t>
+            </a:r>
+            <a:r>
+              <a:rPr lang="en-IN" sz="2200" dirty="0">
+                <a:solidFill>
+                  <a:srgbClr val="000000"/>
+                </a:solidFill>
+                <a:effectLst/>
+                <a:latin typeface="Times New Roman" panose="02020603050405020304" pitchFamily="18" charset="0"/>
+                <a:ea typeface="Calibri" panose="020F0502020204030204" pitchFamily="34" charset="0"/>
+                <a:cs typeface="Times New Roman" panose="02020603050405020304" pitchFamily="18" charset="0"/>
+              </a:rPr>
+              <a:t>two MNN (mixed neural network) architectures for training,. </a:t>
+            </a:r>
+            <a:r>
+              <a:rPr lang="en-US" sz="2200" dirty="0">
+                <a:solidFill>
+                  <a:srgbClr val="000000"/>
+                </a:solidFill>
+                <a:effectLst/>
+                <a:latin typeface="Times New Roman" panose="02020603050405020304" pitchFamily="18" charset="0"/>
+                <a:ea typeface="Calibri" panose="020F0502020204030204" pitchFamily="34" charset="0"/>
+                <a:cs typeface="Times New Roman" panose="02020603050405020304" pitchFamily="18" charset="0"/>
+              </a:rPr>
+              <a:t>A new method is devised to classify leaf diseases based on the results from the ensemble voting classifier. It also aims at developing an efficient system that can meet up with real time leaf disease diagnosis task.</a:t>
+            </a:r>
+            <a:endParaRPr lang="en-US" sz="2200" dirty="0">
+              <a:effectLst/>
+              <a:latin typeface="Times New Roman" panose="02020603050405020304" pitchFamily="18" charset="0"/>
+              <a:ea typeface="Calibri" panose="020F0502020204030204" pitchFamily="34" charset="0"/>
+              <a:cs typeface="Times New Roman" panose="02020603050405020304" pitchFamily="18" charset="0"/>
+            </a:endParaRPr>
+          </a:p>
+          <a:p>
+            <a:pPr algn="just"/>
+            <a:endParaRPr lang="en-US" sz="2200" dirty="0">
+              <a:latin typeface="Times New Roman" panose="02020603050405020304" pitchFamily="18" charset="0"/>
+              <a:cs typeface="Times New Roman" panose="02020603050405020304" pitchFamily="18" charset="0"/>
+            </a:endParaRPr>
           </a:p>
         </p:txBody>
       </p:sp>
     </p:spTree>
     <p:extLst>
       <p:ext uri="{BB962C8B-B14F-4D97-AF65-F5344CB8AC3E}">
-        <p14:creationId xmlns:p14="http://schemas.microsoft.com/office/powerpoint/2010/main" val="2299625743"/>
+        <p14:creationId xmlns:p14="http://schemas.microsoft.com/office/powerpoint/2010/main" val="2903960726"/>
       </p:ext>
     </p:extLst>
   </p:cSld>

</xml_diff>